<commit_message>
Refactor json string to match new format
</commit_message>
<xml_diff>
--- a/images/images.pptx
+++ b/images/images.pptx
@@ -5,7 +5,7 @@
     <p:sldMasterId id="2147483660" r:id="rId1"/>
   </p:sldMasterIdLst>
   <p:notesMasterIdLst>
-    <p:notesMasterId r:id="rId11"/>
+    <p:notesMasterId r:id="rId13"/>
   </p:notesMasterIdLst>
   <p:sldIdLst>
     <p:sldId id="256" r:id="rId2"/>
@@ -17,6 +17,8 @@
     <p:sldId id="258" r:id="rId8"/>
     <p:sldId id="259" r:id="rId9"/>
     <p:sldId id="260" r:id="rId10"/>
+    <p:sldId id="266" r:id="rId11"/>
+    <p:sldId id="267" r:id="rId12"/>
   </p:sldIdLst>
   <p:sldSz cx="9906000" cy="6858000" type="A4"/>
   <p:notesSz cx="6797675" cy="9874250"/>
@@ -205,7 +207,7 @@
           <a:p>
             <a:fld id="{53839B6E-A109-4446-A588-EA233B4D4E04}" type="datetimeFigureOut">
               <a:rPr lang="en-US" smtClean="0"/>
-              <a:t>5/18/2016</a:t>
+              <a:t>5/20/2016</a:t>
             </a:fld>
             <a:endParaRPr lang="en-US"/>
           </a:p>
@@ -604,7 +606,7 @@
           <a:p>
             <a:fld id="{92E94611-3D8C-4AC4-91D2-FCDBAF062134}" type="datetimeFigureOut">
               <a:rPr lang="en-US" smtClean="0"/>
-              <a:t>5/18/2016</a:t>
+              <a:t>5/20/2016</a:t>
             </a:fld>
             <a:endParaRPr lang="en-US"/>
           </a:p>
@@ -774,7 +776,7 @@
           <a:p>
             <a:fld id="{92E94611-3D8C-4AC4-91D2-FCDBAF062134}" type="datetimeFigureOut">
               <a:rPr lang="en-US" smtClean="0"/>
-              <a:t>5/18/2016</a:t>
+              <a:t>5/20/2016</a:t>
             </a:fld>
             <a:endParaRPr lang="en-US"/>
           </a:p>
@@ -954,7 +956,7 @@
           <a:p>
             <a:fld id="{92E94611-3D8C-4AC4-91D2-FCDBAF062134}" type="datetimeFigureOut">
               <a:rPr lang="en-US" smtClean="0"/>
-              <a:t>5/18/2016</a:t>
+              <a:t>5/20/2016</a:t>
             </a:fld>
             <a:endParaRPr lang="en-US"/>
           </a:p>
@@ -1124,7 +1126,7 @@
           <a:p>
             <a:fld id="{92E94611-3D8C-4AC4-91D2-FCDBAF062134}" type="datetimeFigureOut">
               <a:rPr lang="en-US" smtClean="0"/>
-              <a:t>5/18/2016</a:t>
+              <a:t>5/20/2016</a:t>
             </a:fld>
             <a:endParaRPr lang="en-US"/>
           </a:p>
@@ -1368,7 +1370,7 @@
           <a:p>
             <a:fld id="{92E94611-3D8C-4AC4-91D2-FCDBAF062134}" type="datetimeFigureOut">
               <a:rPr lang="en-US" smtClean="0"/>
-              <a:t>5/18/2016</a:t>
+              <a:t>5/20/2016</a:t>
             </a:fld>
             <a:endParaRPr lang="en-US"/>
           </a:p>
@@ -1600,7 +1602,7 @@
           <a:p>
             <a:fld id="{92E94611-3D8C-4AC4-91D2-FCDBAF062134}" type="datetimeFigureOut">
               <a:rPr lang="en-US" smtClean="0"/>
-              <a:t>5/18/2016</a:t>
+              <a:t>5/20/2016</a:t>
             </a:fld>
             <a:endParaRPr lang="en-US"/>
           </a:p>
@@ -1967,7 +1969,7 @@
           <a:p>
             <a:fld id="{92E94611-3D8C-4AC4-91D2-FCDBAF062134}" type="datetimeFigureOut">
               <a:rPr lang="en-US" smtClean="0"/>
-              <a:t>5/18/2016</a:t>
+              <a:t>5/20/2016</a:t>
             </a:fld>
             <a:endParaRPr lang="en-US"/>
           </a:p>
@@ -2085,7 +2087,7 @@
           <a:p>
             <a:fld id="{92E94611-3D8C-4AC4-91D2-FCDBAF062134}" type="datetimeFigureOut">
               <a:rPr lang="en-US" smtClean="0"/>
-              <a:t>5/18/2016</a:t>
+              <a:t>5/20/2016</a:t>
             </a:fld>
             <a:endParaRPr lang="en-US"/>
           </a:p>
@@ -2180,7 +2182,7 @@
           <a:p>
             <a:fld id="{92E94611-3D8C-4AC4-91D2-FCDBAF062134}" type="datetimeFigureOut">
               <a:rPr lang="en-US" smtClean="0"/>
-              <a:t>5/18/2016</a:t>
+              <a:t>5/20/2016</a:t>
             </a:fld>
             <a:endParaRPr lang="en-US"/>
           </a:p>
@@ -2457,7 +2459,7 @@
           <a:p>
             <a:fld id="{92E94611-3D8C-4AC4-91D2-FCDBAF062134}" type="datetimeFigureOut">
               <a:rPr lang="en-US" smtClean="0"/>
-              <a:t>5/18/2016</a:t>
+              <a:t>5/20/2016</a:t>
             </a:fld>
             <a:endParaRPr lang="en-US"/>
           </a:p>
@@ -2714,7 +2716,7 @@
           <a:p>
             <a:fld id="{92E94611-3D8C-4AC4-91D2-FCDBAF062134}" type="datetimeFigureOut">
               <a:rPr lang="en-US" smtClean="0"/>
-              <a:t>5/18/2016</a:t>
+              <a:t>5/20/2016</a:t>
             </a:fld>
             <a:endParaRPr lang="en-US"/>
           </a:p>
@@ -2927,7 +2929,7 @@
           <a:p>
             <a:fld id="{92E94611-3D8C-4AC4-91D2-FCDBAF062134}" type="datetimeFigureOut">
               <a:rPr lang="en-US" smtClean="0"/>
-              <a:t>5/18/2016</a:t>
+              <a:t>5/20/2016</a:t>
             </a:fld>
             <a:endParaRPr lang="en-US"/>
           </a:p>
@@ -4445,6 +4447,1176 @@
     <p:extLst>
       <p:ext uri="{BB962C8B-B14F-4D97-AF65-F5344CB8AC3E}">
         <p14:creationId xmlns:p14="http://schemas.microsoft.com/office/powerpoint/2010/main" val="215762477"/>
+      </p:ext>
+    </p:extLst>
+  </p:cSld>
+  <p:clrMapOvr>
+    <a:masterClrMapping/>
+  </p:clrMapOvr>
+</p:sld>
+</file>
+
+<file path=ppt/slides/slide10.xml><?xml version="1.0" encoding="utf-8"?>
+<p:sld xmlns:a="http://schemas.openxmlformats.org/drawingml/2006/main" xmlns:r="http://schemas.openxmlformats.org/officeDocument/2006/relationships" xmlns:p="http://schemas.openxmlformats.org/presentationml/2006/main">
+  <p:cSld>
+    <p:spTree>
+      <p:nvGrpSpPr>
+        <p:cNvPr id="1" name=""/>
+        <p:cNvGrpSpPr/>
+        <p:nvPr/>
+      </p:nvGrpSpPr>
+      <p:grpSpPr>
+        <a:xfrm>
+          <a:off x="0" y="0"/>
+          <a:ext cx="0" cy="0"/>
+          <a:chOff x="0" y="0"/>
+          <a:chExt cx="0" cy="0"/>
+        </a:xfrm>
+      </p:grpSpPr>
+      <p:sp>
+        <p:nvSpPr>
+          <p:cNvPr id="2" name="TextBox 1"/>
+          <p:cNvSpPr txBox="1"/>
+          <p:nvPr/>
+        </p:nvSpPr>
+        <p:spPr>
+          <a:xfrm>
+            <a:off x="7401464" y="129396"/>
+            <a:ext cx="974498" cy="369332"/>
+          </a:xfrm>
+          <a:prstGeom prst="rect">
+            <a:avLst/>
+          </a:prstGeom>
+          <a:noFill/>
+        </p:spPr>
+        <p:txBody>
+          <a:bodyPr wrap="none" rtlCol="0">
+            <a:spAutoFit/>
+          </a:bodyPr>
+          <a:lstStyle/>
+          <a:p>
+            <a:r>
+              <a:rPr lang="en-US" dirty="0" smtClean="0"/>
+              <a:t>FOR CDs</a:t>
+            </a:r>
+            <a:endParaRPr lang="en-US" dirty="0"/>
+          </a:p>
+        </p:txBody>
+      </p:sp>
+      <p:sp>
+        <p:nvSpPr>
+          <p:cNvPr id="18" name="Oval 17"/>
+          <p:cNvSpPr/>
+          <p:nvPr/>
+        </p:nvSpPr>
+        <p:spPr>
+          <a:xfrm>
+            <a:off x="6151353" y="3767812"/>
+            <a:ext cx="731520" cy="731520"/>
+          </a:xfrm>
+          <a:prstGeom prst="ellipse">
+            <a:avLst/>
+          </a:prstGeom>
+          <a:solidFill>
+            <a:schemeClr val="tx1"/>
+          </a:solidFill>
+          <a:ln>
+            <a:noFill/>
+          </a:ln>
+        </p:spPr>
+        <p:style>
+          <a:lnRef idx="2">
+            <a:schemeClr val="accent1">
+              <a:shade val="50000"/>
+            </a:schemeClr>
+          </a:lnRef>
+          <a:fillRef idx="1">
+            <a:schemeClr val="accent1"/>
+          </a:fillRef>
+          <a:effectRef idx="0">
+            <a:schemeClr val="accent1"/>
+          </a:effectRef>
+          <a:fontRef idx="minor">
+            <a:schemeClr val="lt1"/>
+          </a:fontRef>
+        </p:style>
+        <p:txBody>
+          <a:bodyPr rtlCol="0" anchor="ctr"/>
+          <a:lstStyle/>
+          <a:p>
+            <a:pPr algn="ctr"/>
+            <a:endParaRPr lang="en-US"/>
+          </a:p>
+        </p:txBody>
+      </p:sp>
+      <p:sp>
+        <p:nvSpPr>
+          <p:cNvPr id="19" name="Oval 18"/>
+          <p:cNvSpPr/>
+          <p:nvPr/>
+        </p:nvSpPr>
+        <p:spPr>
+          <a:xfrm>
+            <a:off x="6392957" y="2366894"/>
+            <a:ext cx="274320" cy="822960"/>
+          </a:xfrm>
+          <a:prstGeom prst="ellipse">
+            <a:avLst/>
+          </a:prstGeom>
+          <a:solidFill>
+            <a:schemeClr val="tx1"/>
+          </a:solidFill>
+          <a:ln>
+            <a:noFill/>
+          </a:ln>
+        </p:spPr>
+        <p:style>
+          <a:lnRef idx="2">
+            <a:schemeClr val="accent1">
+              <a:shade val="50000"/>
+            </a:schemeClr>
+          </a:lnRef>
+          <a:fillRef idx="1">
+            <a:schemeClr val="accent1"/>
+          </a:fillRef>
+          <a:effectRef idx="0">
+            <a:schemeClr val="accent1"/>
+          </a:effectRef>
+          <a:fontRef idx="minor">
+            <a:schemeClr val="lt1"/>
+          </a:fontRef>
+        </p:style>
+        <p:txBody>
+          <a:bodyPr rtlCol="0" anchor="ctr"/>
+          <a:lstStyle/>
+          <a:p>
+            <a:pPr algn="ctr"/>
+            <a:endParaRPr lang="en-US"/>
+          </a:p>
+        </p:txBody>
+      </p:sp>
+      <p:sp>
+        <p:nvSpPr>
+          <p:cNvPr id="22" name="Oval 21"/>
+          <p:cNvSpPr/>
+          <p:nvPr/>
+        </p:nvSpPr>
+        <p:spPr>
+          <a:xfrm>
+            <a:off x="4362359" y="1973572"/>
+            <a:ext cx="4320000" cy="4320000"/>
+          </a:xfrm>
+          <a:prstGeom prst="ellipse">
+            <a:avLst/>
+          </a:prstGeom>
+          <a:noFill/>
+        </p:spPr>
+        <p:style>
+          <a:lnRef idx="2">
+            <a:schemeClr val="accent1">
+              <a:shade val="50000"/>
+            </a:schemeClr>
+          </a:lnRef>
+          <a:fillRef idx="1">
+            <a:schemeClr val="accent1"/>
+          </a:fillRef>
+          <a:effectRef idx="0">
+            <a:schemeClr val="accent1"/>
+          </a:effectRef>
+          <a:fontRef idx="minor">
+            <a:schemeClr val="lt1"/>
+          </a:fontRef>
+        </p:style>
+        <p:txBody>
+          <a:bodyPr rtlCol="0" anchor="ctr"/>
+          <a:lstStyle/>
+          <a:p>
+            <a:pPr algn="ctr"/>
+            <a:endParaRPr lang="en-US"/>
+          </a:p>
+        </p:txBody>
+      </p:sp>
+      <p:cxnSp>
+        <p:nvCxnSpPr>
+          <p:cNvPr id="23" name="Straight Connector 22"/>
+          <p:cNvCxnSpPr>
+            <a:stCxn id="22" idx="2"/>
+            <a:endCxn id="22" idx="6"/>
+          </p:cNvCxnSpPr>
+          <p:nvPr/>
+        </p:nvCxnSpPr>
+        <p:spPr>
+          <a:xfrm>
+            <a:off x="4362359" y="4133572"/>
+            <a:ext cx="4320000" cy="0"/>
+          </a:xfrm>
+          <a:prstGeom prst="line">
+            <a:avLst/>
+          </a:prstGeom>
+        </p:spPr>
+        <p:style>
+          <a:lnRef idx="1">
+            <a:schemeClr val="accent1"/>
+          </a:lnRef>
+          <a:fillRef idx="0">
+            <a:schemeClr val="accent1"/>
+          </a:fillRef>
+          <a:effectRef idx="0">
+            <a:schemeClr val="accent1"/>
+          </a:effectRef>
+          <a:fontRef idx="minor">
+            <a:schemeClr val="tx1"/>
+          </a:fontRef>
+        </p:style>
+      </p:cxnSp>
+      <p:cxnSp>
+        <p:nvCxnSpPr>
+          <p:cNvPr id="24" name="Straight Connector 23"/>
+          <p:cNvCxnSpPr>
+            <a:stCxn id="22" idx="0"/>
+            <a:endCxn id="22" idx="4"/>
+          </p:cNvCxnSpPr>
+          <p:nvPr/>
+        </p:nvCxnSpPr>
+        <p:spPr>
+          <a:xfrm>
+            <a:off x="6522359" y="1973572"/>
+            <a:ext cx="0" cy="4320000"/>
+          </a:xfrm>
+          <a:prstGeom prst="line">
+            <a:avLst/>
+          </a:prstGeom>
+        </p:spPr>
+        <p:style>
+          <a:lnRef idx="1">
+            <a:schemeClr val="accent1"/>
+          </a:lnRef>
+          <a:fillRef idx="0">
+            <a:schemeClr val="accent1"/>
+          </a:fillRef>
+          <a:effectRef idx="0">
+            <a:schemeClr val="accent1"/>
+          </a:effectRef>
+          <a:fontRef idx="minor">
+            <a:schemeClr val="tx1"/>
+          </a:fontRef>
+        </p:style>
+      </p:cxnSp>
+      <p:sp>
+        <p:nvSpPr>
+          <p:cNvPr id="25" name="Oval 24"/>
+          <p:cNvSpPr/>
+          <p:nvPr/>
+        </p:nvSpPr>
+        <p:spPr>
+          <a:xfrm>
+            <a:off x="5145513" y="2761972"/>
+            <a:ext cx="2743200" cy="2743200"/>
+          </a:xfrm>
+          <a:prstGeom prst="ellipse">
+            <a:avLst/>
+          </a:prstGeom>
+          <a:noFill/>
+          <a:ln>
+            <a:solidFill>
+              <a:schemeClr val="accent6">
+                <a:lumMod val="75000"/>
+              </a:schemeClr>
+            </a:solidFill>
+          </a:ln>
+        </p:spPr>
+        <p:style>
+          <a:lnRef idx="2">
+            <a:schemeClr val="accent1">
+              <a:shade val="50000"/>
+            </a:schemeClr>
+          </a:lnRef>
+          <a:fillRef idx="1">
+            <a:schemeClr val="accent1"/>
+          </a:fillRef>
+          <a:effectRef idx="0">
+            <a:schemeClr val="accent1"/>
+          </a:effectRef>
+          <a:fontRef idx="minor">
+            <a:schemeClr val="lt1"/>
+          </a:fontRef>
+        </p:style>
+        <p:txBody>
+          <a:bodyPr rtlCol="0" anchor="ctr"/>
+          <a:lstStyle/>
+          <a:p>
+            <a:pPr algn="ctr"/>
+            <a:endParaRPr lang="en-US"/>
+          </a:p>
+        </p:txBody>
+      </p:sp>
+      <p:sp>
+        <p:nvSpPr>
+          <p:cNvPr id="36" name="Oval 35"/>
+          <p:cNvSpPr/>
+          <p:nvPr/>
+        </p:nvSpPr>
+        <p:spPr>
+          <a:xfrm>
+            <a:off x="6334233" y="5322292"/>
+            <a:ext cx="365760" cy="365760"/>
+          </a:xfrm>
+          <a:prstGeom prst="ellipse">
+            <a:avLst/>
+          </a:prstGeom>
+          <a:solidFill>
+            <a:schemeClr val="tx1"/>
+          </a:solidFill>
+          <a:ln>
+            <a:noFill/>
+          </a:ln>
+        </p:spPr>
+        <p:style>
+          <a:lnRef idx="2">
+            <a:schemeClr val="accent1">
+              <a:shade val="50000"/>
+            </a:schemeClr>
+          </a:lnRef>
+          <a:fillRef idx="1">
+            <a:schemeClr val="accent1"/>
+          </a:fillRef>
+          <a:effectRef idx="0">
+            <a:schemeClr val="accent1"/>
+          </a:effectRef>
+          <a:fontRef idx="minor">
+            <a:schemeClr val="lt1"/>
+          </a:fontRef>
+        </p:style>
+        <p:txBody>
+          <a:bodyPr rtlCol="0" anchor="ctr"/>
+          <a:lstStyle/>
+          <a:p>
+            <a:pPr algn="ctr"/>
+            <a:endParaRPr lang="en-US"/>
+          </a:p>
+        </p:txBody>
+      </p:sp>
+      <p:sp>
+        <p:nvSpPr>
+          <p:cNvPr id="39" name="Oval 38"/>
+          <p:cNvSpPr/>
+          <p:nvPr/>
+        </p:nvSpPr>
+        <p:spPr>
+          <a:xfrm>
+            <a:off x="1920171" y="1923636"/>
+            <a:ext cx="731520" cy="731520"/>
+          </a:xfrm>
+          <a:prstGeom prst="ellipse">
+            <a:avLst/>
+          </a:prstGeom>
+          <a:solidFill>
+            <a:schemeClr val="tx1"/>
+          </a:solidFill>
+          <a:ln>
+            <a:noFill/>
+          </a:ln>
+        </p:spPr>
+        <p:style>
+          <a:lnRef idx="2">
+            <a:schemeClr val="accent1">
+              <a:shade val="50000"/>
+            </a:schemeClr>
+          </a:lnRef>
+          <a:fillRef idx="1">
+            <a:schemeClr val="accent1"/>
+          </a:fillRef>
+          <a:effectRef idx="0">
+            <a:schemeClr val="accent1"/>
+          </a:effectRef>
+          <a:fontRef idx="minor">
+            <a:schemeClr val="lt1"/>
+          </a:fontRef>
+        </p:style>
+        <p:txBody>
+          <a:bodyPr rtlCol="0" anchor="ctr"/>
+          <a:lstStyle/>
+          <a:p>
+            <a:pPr algn="ctr"/>
+            <a:endParaRPr lang="en-US"/>
+          </a:p>
+        </p:txBody>
+      </p:sp>
+      <p:sp>
+        <p:nvSpPr>
+          <p:cNvPr id="41" name="Oval 40"/>
+          <p:cNvSpPr/>
+          <p:nvPr/>
+        </p:nvSpPr>
+        <p:spPr>
+          <a:xfrm>
+            <a:off x="2161775" y="522718"/>
+            <a:ext cx="274320" cy="822960"/>
+          </a:xfrm>
+          <a:prstGeom prst="ellipse">
+            <a:avLst/>
+          </a:prstGeom>
+          <a:solidFill>
+            <a:schemeClr val="tx1"/>
+          </a:solidFill>
+          <a:ln>
+            <a:noFill/>
+          </a:ln>
+        </p:spPr>
+        <p:style>
+          <a:lnRef idx="2">
+            <a:schemeClr val="accent1">
+              <a:shade val="50000"/>
+            </a:schemeClr>
+          </a:lnRef>
+          <a:fillRef idx="1">
+            <a:schemeClr val="accent1"/>
+          </a:fillRef>
+          <a:effectRef idx="0">
+            <a:schemeClr val="accent1"/>
+          </a:effectRef>
+          <a:fontRef idx="minor">
+            <a:schemeClr val="lt1"/>
+          </a:fontRef>
+        </p:style>
+        <p:txBody>
+          <a:bodyPr rtlCol="0" anchor="ctr"/>
+          <a:lstStyle/>
+          <a:p>
+            <a:pPr algn="ctr"/>
+            <a:endParaRPr lang="en-US"/>
+          </a:p>
+        </p:txBody>
+      </p:sp>
+      <p:sp>
+        <p:nvSpPr>
+          <p:cNvPr id="42" name="Oval 41"/>
+          <p:cNvSpPr/>
+          <p:nvPr/>
+        </p:nvSpPr>
+        <p:spPr>
+          <a:xfrm>
+            <a:off x="131177" y="129396"/>
+            <a:ext cx="4320000" cy="4320000"/>
+          </a:xfrm>
+          <a:prstGeom prst="ellipse">
+            <a:avLst/>
+          </a:prstGeom>
+          <a:noFill/>
+        </p:spPr>
+        <p:style>
+          <a:lnRef idx="2">
+            <a:schemeClr val="accent1">
+              <a:shade val="50000"/>
+            </a:schemeClr>
+          </a:lnRef>
+          <a:fillRef idx="1">
+            <a:schemeClr val="accent1"/>
+          </a:fillRef>
+          <a:effectRef idx="0">
+            <a:schemeClr val="accent1"/>
+          </a:effectRef>
+          <a:fontRef idx="minor">
+            <a:schemeClr val="lt1"/>
+          </a:fontRef>
+        </p:style>
+        <p:txBody>
+          <a:bodyPr rtlCol="0" anchor="ctr"/>
+          <a:lstStyle/>
+          <a:p>
+            <a:pPr algn="ctr"/>
+            <a:endParaRPr lang="en-US"/>
+          </a:p>
+        </p:txBody>
+      </p:sp>
+      <p:cxnSp>
+        <p:nvCxnSpPr>
+          <p:cNvPr id="45" name="Straight Connector 44"/>
+          <p:cNvCxnSpPr>
+            <a:stCxn id="42" idx="2"/>
+            <a:endCxn id="42" idx="6"/>
+          </p:cNvCxnSpPr>
+          <p:nvPr/>
+        </p:nvCxnSpPr>
+        <p:spPr>
+          <a:xfrm>
+            <a:off x="131177" y="2289396"/>
+            <a:ext cx="4320000" cy="0"/>
+          </a:xfrm>
+          <a:prstGeom prst="line">
+            <a:avLst/>
+          </a:prstGeom>
+        </p:spPr>
+        <p:style>
+          <a:lnRef idx="1">
+            <a:schemeClr val="accent1"/>
+          </a:lnRef>
+          <a:fillRef idx="0">
+            <a:schemeClr val="accent1"/>
+          </a:fillRef>
+          <a:effectRef idx="0">
+            <a:schemeClr val="accent1"/>
+          </a:effectRef>
+          <a:fontRef idx="minor">
+            <a:schemeClr val="tx1"/>
+          </a:fontRef>
+        </p:style>
+      </p:cxnSp>
+      <p:cxnSp>
+        <p:nvCxnSpPr>
+          <p:cNvPr id="46" name="Straight Connector 45"/>
+          <p:cNvCxnSpPr>
+            <a:stCxn id="42" idx="0"/>
+            <a:endCxn id="42" idx="4"/>
+          </p:cNvCxnSpPr>
+          <p:nvPr/>
+        </p:nvCxnSpPr>
+        <p:spPr>
+          <a:xfrm>
+            <a:off x="2291177" y="129396"/>
+            <a:ext cx="0" cy="4320000"/>
+          </a:xfrm>
+          <a:prstGeom prst="line">
+            <a:avLst/>
+          </a:prstGeom>
+        </p:spPr>
+        <p:style>
+          <a:lnRef idx="1">
+            <a:schemeClr val="accent1"/>
+          </a:lnRef>
+          <a:fillRef idx="0">
+            <a:schemeClr val="accent1"/>
+          </a:fillRef>
+          <a:effectRef idx="0">
+            <a:schemeClr val="accent1"/>
+          </a:effectRef>
+          <a:fontRef idx="minor">
+            <a:schemeClr val="tx1"/>
+          </a:fontRef>
+        </p:style>
+      </p:cxnSp>
+      <p:sp>
+        <p:nvSpPr>
+          <p:cNvPr id="47" name="Oval 46"/>
+          <p:cNvSpPr/>
+          <p:nvPr/>
+        </p:nvSpPr>
+        <p:spPr>
+          <a:xfrm>
+            <a:off x="914331" y="917796"/>
+            <a:ext cx="2743200" cy="2743200"/>
+          </a:xfrm>
+          <a:prstGeom prst="ellipse">
+            <a:avLst/>
+          </a:prstGeom>
+          <a:noFill/>
+          <a:ln>
+            <a:solidFill>
+              <a:schemeClr val="accent6">
+                <a:lumMod val="75000"/>
+              </a:schemeClr>
+            </a:solidFill>
+          </a:ln>
+        </p:spPr>
+        <p:style>
+          <a:lnRef idx="2">
+            <a:schemeClr val="accent1">
+              <a:shade val="50000"/>
+            </a:schemeClr>
+          </a:lnRef>
+          <a:fillRef idx="1">
+            <a:schemeClr val="accent1"/>
+          </a:fillRef>
+          <a:effectRef idx="0">
+            <a:schemeClr val="accent1"/>
+          </a:effectRef>
+          <a:fontRef idx="minor">
+            <a:schemeClr val="lt1"/>
+          </a:fontRef>
+        </p:style>
+        <p:txBody>
+          <a:bodyPr rtlCol="0" anchor="ctr"/>
+          <a:lstStyle/>
+          <a:p>
+            <a:pPr algn="ctr"/>
+            <a:endParaRPr lang="en-US"/>
+          </a:p>
+        </p:txBody>
+      </p:sp>
+      <p:sp>
+        <p:nvSpPr>
+          <p:cNvPr id="48" name="Oval 47"/>
+          <p:cNvSpPr/>
+          <p:nvPr/>
+        </p:nvSpPr>
+        <p:spPr>
+          <a:xfrm>
+            <a:off x="3456059" y="2106516"/>
+            <a:ext cx="365760" cy="365760"/>
+          </a:xfrm>
+          <a:prstGeom prst="ellipse">
+            <a:avLst/>
+          </a:prstGeom>
+          <a:solidFill>
+            <a:schemeClr val="tx1"/>
+          </a:solidFill>
+          <a:ln>
+            <a:noFill/>
+          </a:ln>
+        </p:spPr>
+        <p:style>
+          <a:lnRef idx="2">
+            <a:schemeClr val="accent1">
+              <a:shade val="50000"/>
+            </a:schemeClr>
+          </a:lnRef>
+          <a:fillRef idx="1">
+            <a:schemeClr val="accent1"/>
+          </a:fillRef>
+          <a:effectRef idx="0">
+            <a:schemeClr val="accent1"/>
+          </a:effectRef>
+          <a:fontRef idx="minor">
+            <a:schemeClr val="lt1"/>
+          </a:fontRef>
+        </p:style>
+        <p:txBody>
+          <a:bodyPr rtlCol="0" anchor="ctr"/>
+          <a:lstStyle/>
+          <a:p>
+            <a:pPr algn="ctr"/>
+            <a:endParaRPr lang="en-US"/>
+          </a:p>
+        </p:txBody>
+      </p:sp>
+      <p:sp>
+        <p:nvSpPr>
+          <p:cNvPr id="49" name="Oval 48"/>
+          <p:cNvSpPr/>
+          <p:nvPr/>
+        </p:nvSpPr>
+        <p:spPr>
+          <a:xfrm>
+            <a:off x="764211" y="2106516"/>
+            <a:ext cx="365760" cy="365760"/>
+          </a:xfrm>
+          <a:prstGeom prst="ellipse">
+            <a:avLst/>
+          </a:prstGeom>
+          <a:solidFill>
+            <a:schemeClr val="tx1"/>
+          </a:solidFill>
+          <a:ln>
+            <a:noFill/>
+          </a:ln>
+        </p:spPr>
+        <p:style>
+          <a:lnRef idx="2">
+            <a:schemeClr val="accent1">
+              <a:shade val="50000"/>
+            </a:schemeClr>
+          </a:lnRef>
+          <a:fillRef idx="1">
+            <a:schemeClr val="accent1"/>
+          </a:fillRef>
+          <a:effectRef idx="0">
+            <a:schemeClr val="accent1"/>
+          </a:effectRef>
+          <a:fontRef idx="minor">
+            <a:schemeClr val="lt1"/>
+          </a:fontRef>
+        </p:style>
+        <p:txBody>
+          <a:bodyPr rtlCol="0" anchor="ctr"/>
+          <a:lstStyle/>
+          <a:p>
+            <a:pPr algn="ctr"/>
+            <a:endParaRPr lang="en-US"/>
+          </a:p>
+        </p:txBody>
+      </p:sp>
+    </p:spTree>
+    <p:extLst>
+      <p:ext uri="{BB962C8B-B14F-4D97-AF65-F5344CB8AC3E}">
+        <p14:creationId xmlns:p14="http://schemas.microsoft.com/office/powerpoint/2010/main" val="1140870023"/>
+      </p:ext>
+    </p:extLst>
+  </p:cSld>
+  <p:clrMapOvr>
+    <a:masterClrMapping/>
+  </p:clrMapOvr>
+</p:sld>
+</file>
+
+<file path=ppt/slides/slide11.xml><?xml version="1.0" encoding="utf-8"?>
+<p:sld xmlns:a="http://schemas.openxmlformats.org/drawingml/2006/main" xmlns:r="http://schemas.openxmlformats.org/officeDocument/2006/relationships" xmlns:p="http://schemas.openxmlformats.org/presentationml/2006/main">
+  <p:cSld>
+    <p:spTree>
+      <p:nvGrpSpPr>
+        <p:cNvPr id="1" name=""/>
+        <p:cNvGrpSpPr/>
+        <p:nvPr/>
+      </p:nvGrpSpPr>
+      <p:grpSpPr>
+        <a:xfrm>
+          <a:off x="0" y="0"/>
+          <a:ext cx="0" cy="0"/>
+          <a:chOff x="0" y="0"/>
+          <a:chExt cx="0" cy="0"/>
+        </a:xfrm>
+      </p:grpSpPr>
+      <p:sp>
+        <p:nvSpPr>
+          <p:cNvPr id="2" name="TextBox 1"/>
+          <p:cNvSpPr txBox="1"/>
+          <p:nvPr/>
+        </p:nvSpPr>
+        <p:spPr>
+          <a:xfrm>
+            <a:off x="7401464" y="129396"/>
+            <a:ext cx="974498" cy="369332"/>
+          </a:xfrm>
+          <a:prstGeom prst="rect">
+            <a:avLst/>
+          </a:prstGeom>
+          <a:noFill/>
+        </p:spPr>
+        <p:txBody>
+          <a:bodyPr wrap="none" rtlCol="0">
+            <a:spAutoFit/>
+          </a:bodyPr>
+          <a:lstStyle/>
+          <a:p>
+            <a:r>
+              <a:rPr lang="en-US" dirty="0" smtClean="0"/>
+              <a:t>FOR CDs</a:t>
+            </a:r>
+            <a:endParaRPr lang="en-US" dirty="0"/>
+          </a:p>
+        </p:txBody>
+      </p:sp>
+      <p:sp>
+        <p:nvSpPr>
+          <p:cNvPr id="18" name="Oval 17"/>
+          <p:cNvSpPr/>
+          <p:nvPr/>
+        </p:nvSpPr>
+        <p:spPr>
+          <a:xfrm>
+            <a:off x="6151353" y="3767812"/>
+            <a:ext cx="731520" cy="731520"/>
+          </a:xfrm>
+          <a:prstGeom prst="ellipse">
+            <a:avLst/>
+          </a:prstGeom>
+          <a:solidFill>
+            <a:schemeClr val="tx1"/>
+          </a:solidFill>
+          <a:ln>
+            <a:noFill/>
+          </a:ln>
+        </p:spPr>
+        <p:style>
+          <a:lnRef idx="2">
+            <a:schemeClr val="accent1">
+              <a:shade val="50000"/>
+            </a:schemeClr>
+          </a:lnRef>
+          <a:fillRef idx="1">
+            <a:schemeClr val="accent1"/>
+          </a:fillRef>
+          <a:effectRef idx="0">
+            <a:schemeClr val="accent1"/>
+          </a:effectRef>
+          <a:fontRef idx="minor">
+            <a:schemeClr val="lt1"/>
+          </a:fontRef>
+        </p:style>
+        <p:txBody>
+          <a:bodyPr rtlCol="0" anchor="ctr"/>
+          <a:lstStyle/>
+          <a:p>
+            <a:pPr algn="ctr"/>
+            <a:endParaRPr lang="en-US"/>
+          </a:p>
+        </p:txBody>
+      </p:sp>
+      <p:sp>
+        <p:nvSpPr>
+          <p:cNvPr id="19" name="Oval 18"/>
+          <p:cNvSpPr/>
+          <p:nvPr/>
+        </p:nvSpPr>
+        <p:spPr>
+          <a:xfrm>
+            <a:off x="6392957" y="2366894"/>
+            <a:ext cx="274320" cy="822960"/>
+          </a:xfrm>
+          <a:prstGeom prst="ellipse">
+            <a:avLst/>
+          </a:prstGeom>
+          <a:solidFill>
+            <a:schemeClr val="tx1"/>
+          </a:solidFill>
+          <a:ln>
+            <a:noFill/>
+          </a:ln>
+        </p:spPr>
+        <p:style>
+          <a:lnRef idx="2">
+            <a:schemeClr val="accent1">
+              <a:shade val="50000"/>
+            </a:schemeClr>
+          </a:lnRef>
+          <a:fillRef idx="1">
+            <a:schemeClr val="accent1"/>
+          </a:fillRef>
+          <a:effectRef idx="0">
+            <a:schemeClr val="accent1"/>
+          </a:effectRef>
+          <a:fontRef idx="minor">
+            <a:schemeClr val="lt1"/>
+          </a:fontRef>
+        </p:style>
+        <p:txBody>
+          <a:bodyPr rtlCol="0" anchor="ctr"/>
+          <a:lstStyle/>
+          <a:p>
+            <a:pPr algn="ctr"/>
+            <a:endParaRPr lang="en-US"/>
+          </a:p>
+        </p:txBody>
+      </p:sp>
+      <p:sp>
+        <p:nvSpPr>
+          <p:cNvPr id="22" name="Oval 21"/>
+          <p:cNvSpPr/>
+          <p:nvPr/>
+        </p:nvSpPr>
+        <p:spPr>
+          <a:xfrm>
+            <a:off x="4362359" y="1973572"/>
+            <a:ext cx="4320000" cy="4320000"/>
+          </a:xfrm>
+          <a:prstGeom prst="ellipse">
+            <a:avLst/>
+          </a:prstGeom>
+          <a:noFill/>
+          <a:ln>
+            <a:solidFill>
+              <a:schemeClr val="bg1">
+                <a:lumMod val="85000"/>
+              </a:schemeClr>
+            </a:solidFill>
+          </a:ln>
+        </p:spPr>
+        <p:style>
+          <a:lnRef idx="2">
+            <a:schemeClr val="accent1">
+              <a:shade val="50000"/>
+            </a:schemeClr>
+          </a:lnRef>
+          <a:fillRef idx="1">
+            <a:schemeClr val="accent1"/>
+          </a:fillRef>
+          <a:effectRef idx="0">
+            <a:schemeClr val="accent1"/>
+          </a:effectRef>
+          <a:fontRef idx="minor">
+            <a:schemeClr val="lt1"/>
+          </a:fontRef>
+        </p:style>
+        <p:txBody>
+          <a:bodyPr rtlCol="0" anchor="ctr"/>
+          <a:lstStyle/>
+          <a:p>
+            <a:pPr algn="ctr"/>
+            <a:endParaRPr lang="en-US"/>
+          </a:p>
+        </p:txBody>
+      </p:sp>
+      <p:sp>
+        <p:nvSpPr>
+          <p:cNvPr id="36" name="Oval 35"/>
+          <p:cNvSpPr/>
+          <p:nvPr/>
+        </p:nvSpPr>
+        <p:spPr>
+          <a:xfrm>
+            <a:off x="6334233" y="5322292"/>
+            <a:ext cx="365760" cy="365760"/>
+          </a:xfrm>
+          <a:prstGeom prst="ellipse">
+            <a:avLst/>
+          </a:prstGeom>
+          <a:solidFill>
+            <a:schemeClr val="tx1"/>
+          </a:solidFill>
+          <a:ln>
+            <a:noFill/>
+          </a:ln>
+        </p:spPr>
+        <p:style>
+          <a:lnRef idx="2">
+            <a:schemeClr val="accent1">
+              <a:shade val="50000"/>
+            </a:schemeClr>
+          </a:lnRef>
+          <a:fillRef idx="1">
+            <a:schemeClr val="accent1"/>
+          </a:fillRef>
+          <a:effectRef idx="0">
+            <a:schemeClr val="accent1"/>
+          </a:effectRef>
+          <a:fontRef idx="minor">
+            <a:schemeClr val="lt1"/>
+          </a:fontRef>
+        </p:style>
+        <p:txBody>
+          <a:bodyPr rtlCol="0" anchor="ctr"/>
+          <a:lstStyle/>
+          <a:p>
+            <a:pPr algn="ctr"/>
+            <a:endParaRPr lang="en-US"/>
+          </a:p>
+        </p:txBody>
+      </p:sp>
+      <p:sp>
+        <p:nvSpPr>
+          <p:cNvPr id="39" name="Oval 38"/>
+          <p:cNvSpPr/>
+          <p:nvPr/>
+        </p:nvSpPr>
+        <p:spPr>
+          <a:xfrm>
+            <a:off x="1920171" y="1923636"/>
+            <a:ext cx="731520" cy="731520"/>
+          </a:xfrm>
+          <a:prstGeom prst="ellipse">
+            <a:avLst/>
+          </a:prstGeom>
+          <a:solidFill>
+            <a:schemeClr val="tx1"/>
+          </a:solidFill>
+          <a:ln>
+            <a:noFill/>
+          </a:ln>
+        </p:spPr>
+        <p:style>
+          <a:lnRef idx="2">
+            <a:schemeClr val="accent1">
+              <a:shade val="50000"/>
+            </a:schemeClr>
+          </a:lnRef>
+          <a:fillRef idx="1">
+            <a:schemeClr val="accent1"/>
+          </a:fillRef>
+          <a:effectRef idx="0">
+            <a:schemeClr val="accent1"/>
+          </a:effectRef>
+          <a:fontRef idx="minor">
+            <a:schemeClr val="lt1"/>
+          </a:fontRef>
+        </p:style>
+        <p:txBody>
+          <a:bodyPr rtlCol="0" anchor="ctr"/>
+          <a:lstStyle/>
+          <a:p>
+            <a:pPr algn="ctr"/>
+            <a:endParaRPr lang="en-US"/>
+          </a:p>
+        </p:txBody>
+      </p:sp>
+      <p:sp>
+        <p:nvSpPr>
+          <p:cNvPr id="41" name="Oval 40"/>
+          <p:cNvSpPr/>
+          <p:nvPr/>
+        </p:nvSpPr>
+        <p:spPr>
+          <a:xfrm>
+            <a:off x="2161775" y="522718"/>
+            <a:ext cx="274320" cy="822960"/>
+          </a:xfrm>
+          <a:prstGeom prst="ellipse">
+            <a:avLst/>
+          </a:prstGeom>
+          <a:solidFill>
+            <a:schemeClr val="tx1"/>
+          </a:solidFill>
+          <a:ln>
+            <a:noFill/>
+          </a:ln>
+        </p:spPr>
+        <p:style>
+          <a:lnRef idx="2">
+            <a:schemeClr val="accent1">
+              <a:shade val="50000"/>
+            </a:schemeClr>
+          </a:lnRef>
+          <a:fillRef idx="1">
+            <a:schemeClr val="accent1"/>
+          </a:fillRef>
+          <a:effectRef idx="0">
+            <a:schemeClr val="accent1"/>
+          </a:effectRef>
+          <a:fontRef idx="minor">
+            <a:schemeClr val="lt1"/>
+          </a:fontRef>
+        </p:style>
+        <p:txBody>
+          <a:bodyPr rtlCol="0" anchor="ctr"/>
+          <a:lstStyle/>
+          <a:p>
+            <a:pPr algn="ctr"/>
+            <a:endParaRPr lang="en-US"/>
+          </a:p>
+        </p:txBody>
+      </p:sp>
+      <p:sp>
+        <p:nvSpPr>
+          <p:cNvPr id="42" name="Oval 41"/>
+          <p:cNvSpPr/>
+          <p:nvPr/>
+        </p:nvSpPr>
+        <p:spPr>
+          <a:xfrm>
+            <a:off x="131177" y="129396"/>
+            <a:ext cx="4320000" cy="4320000"/>
+          </a:xfrm>
+          <a:prstGeom prst="ellipse">
+            <a:avLst/>
+          </a:prstGeom>
+          <a:noFill/>
+          <a:ln>
+            <a:solidFill>
+              <a:schemeClr val="bg1">
+                <a:lumMod val="85000"/>
+              </a:schemeClr>
+            </a:solidFill>
+          </a:ln>
+        </p:spPr>
+        <p:style>
+          <a:lnRef idx="2">
+            <a:schemeClr val="accent1">
+              <a:shade val="50000"/>
+            </a:schemeClr>
+          </a:lnRef>
+          <a:fillRef idx="1">
+            <a:schemeClr val="accent1"/>
+          </a:fillRef>
+          <a:effectRef idx="0">
+            <a:schemeClr val="accent1"/>
+          </a:effectRef>
+          <a:fontRef idx="minor">
+            <a:schemeClr val="lt1"/>
+          </a:fontRef>
+        </p:style>
+        <p:txBody>
+          <a:bodyPr rtlCol="0" anchor="ctr"/>
+          <a:lstStyle/>
+          <a:p>
+            <a:pPr algn="ctr"/>
+            <a:endParaRPr lang="en-US"/>
+          </a:p>
+        </p:txBody>
+      </p:sp>
+      <p:sp>
+        <p:nvSpPr>
+          <p:cNvPr id="17" name="Oval 16"/>
+          <p:cNvSpPr/>
+          <p:nvPr/>
+        </p:nvSpPr>
+        <p:spPr>
+          <a:xfrm>
+            <a:off x="3456059" y="2106516"/>
+            <a:ext cx="365760" cy="365760"/>
+          </a:xfrm>
+          <a:prstGeom prst="ellipse">
+            <a:avLst/>
+          </a:prstGeom>
+          <a:solidFill>
+            <a:schemeClr val="tx1"/>
+          </a:solidFill>
+          <a:ln>
+            <a:noFill/>
+          </a:ln>
+        </p:spPr>
+        <p:style>
+          <a:lnRef idx="2">
+            <a:schemeClr val="accent1">
+              <a:shade val="50000"/>
+            </a:schemeClr>
+          </a:lnRef>
+          <a:fillRef idx="1">
+            <a:schemeClr val="accent1"/>
+          </a:fillRef>
+          <a:effectRef idx="0">
+            <a:schemeClr val="accent1"/>
+          </a:effectRef>
+          <a:fontRef idx="minor">
+            <a:schemeClr val="lt1"/>
+          </a:fontRef>
+        </p:style>
+        <p:txBody>
+          <a:bodyPr rtlCol="0" anchor="ctr"/>
+          <a:lstStyle/>
+          <a:p>
+            <a:pPr algn="ctr"/>
+            <a:endParaRPr lang="en-US"/>
+          </a:p>
+        </p:txBody>
+      </p:sp>
+      <p:sp>
+        <p:nvSpPr>
+          <p:cNvPr id="20" name="Oval 19"/>
+          <p:cNvSpPr/>
+          <p:nvPr/>
+        </p:nvSpPr>
+        <p:spPr>
+          <a:xfrm>
+            <a:off x="764211" y="2106516"/>
+            <a:ext cx="365760" cy="365760"/>
+          </a:xfrm>
+          <a:prstGeom prst="ellipse">
+            <a:avLst/>
+          </a:prstGeom>
+          <a:solidFill>
+            <a:schemeClr val="tx1"/>
+          </a:solidFill>
+          <a:ln>
+            <a:noFill/>
+          </a:ln>
+        </p:spPr>
+        <p:style>
+          <a:lnRef idx="2">
+            <a:schemeClr val="accent1">
+              <a:shade val="50000"/>
+            </a:schemeClr>
+          </a:lnRef>
+          <a:fillRef idx="1">
+            <a:schemeClr val="accent1"/>
+          </a:fillRef>
+          <a:effectRef idx="0">
+            <a:schemeClr val="accent1"/>
+          </a:effectRef>
+          <a:fontRef idx="minor">
+            <a:schemeClr val="lt1"/>
+          </a:fontRef>
+        </p:style>
+        <p:txBody>
+          <a:bodyPr rtlCol="0" anchor="ctr"/>
+          <a:lstStyle/>
+          <a:p>
+            <a:pPr algn="ctr"/>
+            <a:endParaRPr lang="en-US"/>
+          </a:p>
+        </p:txBody>
+      </p:sp>
+    </p:spTree>
+    <p:extLst>
+      <p:ext uri="{BB962C8B-B14F-4D97-AF65-F5344CB8AC3E}">
+        <p14:creationId xmlns:p14="http://schemas.microsoft.com/office/powerpoint/2010/main" val="2064107572"/>
       </p:ext>
     </p:extLst>
   </p:cSld>

</xml_diff>